<commit_message>
initial should I use git flow presentation section
</commit_message>
<xml_diff>
--- a/Github Workflow.pptx
+++ b/Github Workflow.pptx
@@ -12,6 +12,7 @@
     <p:sldId id="261" r:id="rId6"/>
     <p:sldId id="262" r:id="rId7"/>
     <p:sldId id="258" r:id="rId8"/>
+    <p:sldId id="263" r:id="rId9"/>
   </p:sldIdLst>
   <p:sldSz cx="12192000" cy="6858000"/>
   <p:notesSz cx="6858000" cy="9144000"/>
@@ -13102,10 +13103,15 @@
             <p:ph idx="1"/>
           </p:nvPr>
         </p:nvSpPr>
-        <p:spPr/>
+        <p:spPr>
+          <a:xfrm>
+            <a:off x="1141412" y="2249486"/>
+            <a:ext cx="9905999" cy="4109749"/>
+          </a:xfrm>
+        </p:spPr>
         <p:txBody>
           <a:bodyPr>
-            <a:normAutofit fontScale="85000" lnSpcReduction="20000"/>
+            <a:normAutofit fontScale="92500" lnSpcReduction="10000"/>
           </a:bodyPr>
           <a:lstStyle/>
           <a:p>
@@ -13168,13 +13174,10 @@
               <a:t>Consider adding files that repeatedly appear to your .</a:t>
             </a:r>
             <a:r>
-              <a:rPr lang="en-IE"/>
+              <a:rPr lang="en-IE" dirty="0" err="1"/>
               <a:t>gitignore</a:t>
             </a:r>
             <a:endParaRPr lang="en-IE" dirty="0"/>
-          </a:p>
-          <a:p>
-            <a:endParaRPr lang="LID4096" dirty="0"/>
           </a:p>
         </p:txBody>
       </p:sp>
@@ -13182,6 +13185,144 @@
     <p:extLst>
       <p:ext uri="{BB962C8B-B14F-4D97-AF65-F5344CB8AC3E}">
         <p14:creationId xmlns:p14="http://schemas.microsoft.com/office/powerpoint/2010/main" val="3713447497"/>
+      </p:ext>
+    </p:extLst>
+  </p:cSld>
+  <p:clrMapOvr>
+    <a:masterClrMapping/>
+  </p:clrMapOvr>
+</p:sld>
+</file>
+
+<file path=ppt/slides/slide8.xml><?xml version="1.0" encoding="utf-8"?>
+<p:sld xmlns:a="http://schemas.openxmlformats.org/drawingml/2006/main" xmlns:r="http://schemas.openxmlformats.org/officeDocument/2006/relationships" xmlns:p="http://schemas.openxmlformats.org/presentationml/2006/main">
+  <p:cSld>
+    <p:spTree>
+      <p:nvGrpSpPr>
+        <p:cNvPr id="1" name=""/>
+        <p:cNvGrpSpPr/>
+        <p:nvPr/>
+      </p:nvGrpSpPr>
+      <p:grpSpPr>
+        <a:xfrm>
+          <a:off x="0" y="0"/>
+          <a:ext cx="0" cy="0"/>
+          <a:chOff x="0" y="0"/>
+          <a:chExt cx="0" cy="0"/>
+        </a:xfrm>
+      </p:grpSpPr>
+      <p:sp>
+        <p:nvSpPr>
+          <p:cNvPr id="2" name="Title 1">
+            <a:extLst>
+              <a:ext uri="{FF2B5EF4-FFF2-40B4-BE49-F238E27FC236}">
+                <a16:creationId xmlns:a16="http://schemas.microsoft.com/office/drawing/2014/main" id="{107E89F7-0FD5-4442-B05D-FAC0579F3E1B}"/>
+              </a:ext>
+            </a:extLst>
+          </p:cNvPr>
+          <p:cNvSpPr>
+            <a:spLocks noGrp="1"/>
+          </p:cNvSpPr>
+          <p:nvPr>
+            <p:ph type="title"/>
+          </p:nvPr>
+        </p:nvSpPr>
+        <p:spPr/>
+        <p:txBody>
+          <a:bodyPr/>
+          <a:lstStyle/>
+          <a:p>
+            <a:r>
+              <a:rPr lang="en-IE" dirty="0"/>
+              <a:t>Git Flow</a:t>
+            </a:r>
+            <a:r>
+              <a:rPr lang="en-IE"/>
+              <a:t>: Should I use it?</a:t>
+            </a:r>
+            <a:endParaRPr lang="LID4096" dirty="0"/>
+          </a:p>
+        </p:txBody>
+      </p:sp>
+      <p:sp>
+        <p:nvSpPr>
+          <p:cNvPr id="3" name="Content Placeholder 2">
+            <a:extLst>
+              <a:ext uri="{FF2B5EF4-FFF2-40B4-BE49-F238E27FC236}">
+                <a16:creationId xmlns:a16="http://schemas.microsoft.com/office/drawing/2014/main" id="{5C4F7C72-F06C-4A70-BE39-D9C57AA317BC}"/>
+              </a:ext>
+            </a:extLst>
+          </p:cNvPr>
+          <p:cNvSpPr>
+            <a:spLocks noGrp="1"/>
+          </p:cNvSpPr>
+          <p:nvPr>
+            <p:ph idx="1"/>
+          </p:nvPr>
+        </p:nvSpPr>
+        <p:spPr/>
+        <p:txBody>
+          <a:bodyPr/>
+          <a:lstStyle/>
+          <a:p>
+            <a:r>
+              <a:rPr lang="en-IE" dirty="0"/>
+              <a:t>Overkill?</a:t>
+            </a:r>
+          </a:p>
+          <a:p>
+            <a:pPr lvl="1"/>
+            <a:r>
+              <a:rPr lang="en-IE" dirty="0"/>
+              <a:t>You likely don’t need all the tools provided by Git Flow (e.g. hotfixes, patches etc.)</a:t>
+            </a:r>
+          </a:p>
+          <a:p>
+            <a:pPr lvl="1"/>
+            <a:r>
+              <a:rPr lang="en-IE" dirty="0"/>
+              <a:t>Separate </a:t>
+            </a:r>
+            <a:r>
+              <a:rPr lang="en-IE" dirty="0">
+                <a:latin typeface="Consolas" panose="020B0609020204030204" pitchFamily="49" charset="0"/>
+              </a:rPr>
+              <a:t>master</a:t>
+            </a:r>
+            <a:r>
+              <a:rPr lang="en-IE" dirty="0"/>
+              <a:t> and </a:t>
+            </a:r>
+            <a:r>
+              <a:rPr lang="en-IE" dirty="0">
+                <a:latin typeface="Consolas" panose="020B0609020204030204" pitchFamily="49" charset="0"/>
+              </a:rPr>
+              <a:t>dev</a:t>
+            </a:r>
+            <a:r>
+              <a:rPr lang="en-IE" dirty="0"/>
+              <a:t> branches may be unnecessary</a:t>
+            </a:r>
+          </a:p>
+          <a:p>
+            <a:r>
+              <a:rPr lang="en-IE" dirty="0"/>
+              <a:t>Follow the Key Principles</a:t>
+            </a:r>
+          </a:p>
+          <a:p>
+            <a:pPr lvl="1"/>
+            <a:r>
+              <a:rPr lang="en-IE" dirty="0"/>
+              <a:t>Always write new code in a branch, never in the main branch</a:t>
+            </a:r>
+          </a:p>
+        </p:txBody>
+      </p:sp>
+    </p:spTree>
+    <p:extLst>
+      <p:ext uri="{BB962C8B-B14F-4D97-AF65-F5344CB8AC3E}">
+        <p14:creationId xmlns:p14="http://schemas.microsoft.com/office/powerpoint/2010/main" val="3206392519"/>
       </p:ext>
     </p:extLst>
   </p:cSld>

</xml_diff>

<commit_message>
added DRY and SOLID sections to presentation
</commit_message>
<xml_diff>
--- a/Github Workflow.pptx
+++ b/Github Workflow.pptx
@@ -13,6 +13,11 @@
     <p:sldId id="262" r:id="rId7"/>
     <p:sldId id="258" r:id="rId8"/>
     <p:sldId id="263" r:id="rId9"/>
+    <p:sldId id="264" r:id="rId10"/>
+    <p:sldId id="265" r:id="rId11"/>
+    <p:sldId id="266" r:id="rId12"/>
+    <p:sldId id="267" r:id="rId13"/>
+    <p:sldId id="268" r:id="rId14"/>
   </p:sldIdLst>
   <p:sldSz cx="12192000" cy="6858000"/>
   <p:notesSz cx="6858000" cy="9144000"/>
@@ -111,6 +116,11 @@
       </a:defRPr>
     </a:lvl9pPr>
   </p:defaultTextStyle>
+  <p:extLst>
+    <p:ext uri="{EFAFB233-063F-42B5-8137-9DF3F51BA10A}">
+      <p15:sldGuideLst xmlns:p15="http://schemas.microsoft.com/office/powerpoint/2012/main"/>
+    </p:ext>
+  </p:extLst>
 </p:presentation>
 </file>
 
@@ -164,7 +174,7 @@
           <a:noFill/>
           <a:extLst>
             <a:ext uri="{909E8E84-426E-40dd-AFC4-6F175D3DCCD1}">
-              <a14:hiddenFill xmlns:a14="http://schemas.microsoft.com/office/drawing/2010/main" xmlns="">
+              <a14:hiddenFill xmlns="" xmlns:a14="http://schemas.microsoft.com/office/drawing/2010/main">
                 <a:solidFill>
                   <a:srgbClr val="FFFFFF"/>
                 </a:solidFill>
@@ -224,7 +234,7 @@
             </a:ln>
             <a:extLst>
               <a:ext uri="{91240B29-F687-4f45-9708-019B960494DF}">
-                <a14:hiddenLine xmlns:a14="http://schemas.microsoft.com/office/drawing/2010/main" xmlns="" w="9525">
+                <a14:hiddenLine xmlns="" xmlns:a14="http://schemas.microsoft.com/office/drawing/2010/main" w="9525">
                   <a:solidFill>
                     <a:srgbClr val="000000"/>
                   </a:solidFill>
@@ -314,7 +324,7 @@
             </a:ln>
             <a:extLst>
               <a:ext uri="{91240B29-F687-4f45-9708-019B960494DF}">
-                <a14:hiddenLine xmlns:a14="http://schemas.microsoft.com/office/drawing/2010/main" xmlns="" w="9525">
+                <a14:hiddenLine xmlns="" xmlns:a14="http://schemas.microsoft.com/office/drawing/2010/main" w="9525">
                   <a:solidFill>
                     <a:srgbClr val="000000"/>
                   </a:solidFill>
@@ -404,7 +414,7 @@
             </a:ln>
             <a:extLst>
               <a:ext uri="{91240B29-F687-4f45-9708-019B960494DF}">
-                <a14:hiddenLine xmlns:a14="http://schemas.microsoft.com/office/drawing/2010/main" xmlns="" w="9525">
+                <a14:hiddenLine xmlns="" xmlns:a14="http://schemas.microsoft.com/office/drawing/2010/main" w="9525">
                   <a:solidFill>
                     <a:srgbClr val="000000"/>
                   </a:solidFill>
@@ -438,7 +448,7 @@
             </a:ln>
             <a:extLst>
               <a:ext uri="{91240B29-F687-4f45-9708-019B960494DF}">
-                <a14:hiddenLine xmlns:a14="http://schemas.microsoft.com/office/drawing/2010/main" xmlns="" w="9525">
+                <a14:hiddenLine xmlns="" xmlns:a14="http://schemas.microsoft.com/office/drawing/2010/main" w="9525">
                   <a:solidFill>
                     <a:srgbClr val="000000"/>
                   </a:solidFill>
@@ -528,7 +538,7 @@
             </a:ln>
             <a:extLst>
               <a:ext uri="{91240B29-F687-4f45-9708-019B960494DF}">
-                <a14:hiddenLine xmlns:a14="http://schemas.microsoft.com/office/drawing/2010/main" xmlns="" w="9525">
+                <a14:hiddenLine xmlns="" xmlns:a14="http://schemas.microsoft.com/office/drawing/2010/main" w="9525">
                   <a:solidFill>
                     <a:srgbClr val="000000"/>
                   </a:solidFill>
@@ -590,7 +600,7 @@
             </a:ln>
             <a:extLst>
               <a:ext uri="{91240B29-F687-4f45-9708-019B960494DF}">
-                <a14:hiddenLine xmlns:a14="http://schemas.microsoft.com/office/drawing/2010/main" xmlns="" w="9525">
+                <a14:hiddenLine xmlns="" xmlns:a14="http://schemas.microsoft.com/office/drawing/2010/main" w="9525">
                   <a:solidFill>
                     <a:srgbClr val="000000"/>
                   </a:solidFill>
@@ -652,7 +662,7 @@
             </a:ln>
             <a:extLst>
               <a:ext uri="{91240B29-F687-4f45-9708-019B960494DF}">
-                <a14:hiddenLine xmlns:a14="http://schemas.microsoft.com/office/drawing/2010/main" xmlns="" w="9525">
+                <a14:hiddenLine xmlns="" xmlns:a14="http://schemas.microsoft.com/office/drawing/2010/main" w="9525">
                   <a:solidFill>
                     <a:srgbClr val="000000"/>
                   </a:solidFill>
@@ -742,7 +752,7 @@
             </a:ln>
             <a:extLst>
               <a:ext uri="{91240B29-F687-4f45-9708-019B960494DF}">
-                <a14:hiddenLine xmlns:a14="http://schemas.microsoft.com/office/drawing/2010/main" xmlns="" w="9525">
+                <a14:hiddenLine xmlns="" xmlns:a14="http://schemas.microsoft.com/office/drawing/2010/main" w="9525">
                   <a:solidFill>
                     <a:srgbClr val="000000"/>
                   </a:solidFill>
@@ -804,7 +814,7 @@
             </a:ln>
             <a:extLst>
               <a:ext uri="{91240B29-F687-4f45-9708-019B960494DF}">
-                <a14:hiddenLine xmlns:a14="http://schemas.microsoft.com/office/drawing/2010/main" xmlns="" w="9525">
+                <a14:hiddenLine xmlns="" xmlns:a14="http://schemas.microsoft.com/office/drawing/2010/main" w="9525">
                   <a:solidFill>
                     <a:srgbClr val="000000"/>
                   </a:solidFill>
@@ -866,7 +876,7 @@
             </a:ln>
             <a:extLst>
               <a:ext uri="{91240B29-F687-4f45-9708-019B960494DF}">
-                <a14:hiddenLine xmlns:a14="http://schemas.microsoft.com/office/drawing/2010/main" xmlns="" w="9525">
+                <a14:hiddenLine xmlns="" xmlns:a14="http://schemas.microsoft.com/office/drawing/2010/main" w="9525">
                   <a:solidFill>
                     <a:srgbClr val="000000"/>
                   </a:solidFill>
@@ -956,7 +966,7 @@
             </a:ln>
             <a:extLst>
               <a:ext uri="{91240B29-F687-4f45-9708-019B960494DF}">
-                <a14:hiddenLine xmlns:a14="http://schemas.microsoft.com/office/drawing/2010/main" xmlns="" w="9525">
+                <a14:hiddenLine xmlns="" xmlns:a14="http://schemas.microsoft.com/office/drawing/2010/main" w="9525">
                   <a:solidFill>
                     <a:srgbClr val="000000"/>
                   </a:solidFill>
@@ -1046,7 +1056,7 @@
             </a:ln>
             <a:extLst>
               <a:ext uri="{91240B29-F687-4f45-9708-019B960494DF}">
-                <a14:hiddenLine xmlns:a14="http://schemas.microsoft.com/office/drawing/2010/main" xmlns="" w="9525">
+                <a14:hiddenLine xmlns="" xmlns:a14="http://schemas.microsoft.com/office/drawing/2010/main" w="9525">
                   <a:solidFill>
                     <a:srgbClr val="000000"/>
                   </a:solidFill>
@@ -1108,7 +1118,7 @@
             </a:ln>
             <a:extLst>
               <a:ext uri="{91240B29-F687-4f45-9708-019B960494DF}">
-                <a14:hiddenLine xmlns:a14="http://schemas.microsoft.com/office/drawing/2010/main" xmlns="" w="9525">
+                <a14:hiddenLine xmlns="" xmlns:a14="http://schemas.microsoft.com/office/drawing/2010/main" w="9525">
                   <a:solidFill>
                     <a:srgbClr val="000000"/>
                   </a:solidFill>
@@ -1218,7 +1228,7 @@
             </a:ln>
             <a:extLst>
               <a:ext uri="{91240B29-F687-4f45-9708-019B960494DF}">
-                <a14:hiddenLine xmlns:a14="http://schemas.microsoft.com/office/drawing/2010/main" xmlns="" w="9525">
+                <a14:hiddenLine xmlns="" xmlns:a14="http://schemas.microsoft.com/office/drawing/2010/main" w="9525">
                   <a:solidFill>
                     <a:srgbClr val="000000"/>
                   </a:solidFill>
@@ -1280,7 +1290,7 @@
             </a:ln>
             <a:extLst>
               <a:ext uri="{91240B29-F687-4f45-9708-019B960494DF}">
-                <a14:hiddenLine xmlns:a14="http://schemas.microsoft.com/office/drawing/2010/main" xmlns="" w="9525">
+                <a14:hiddenLine xmlns="" xmlns:a14="http://schemas.microsoft.com/office/drawing/2010/main" w="9525">
                   <a:solidFill>
                     <a:srgbClr val="000000"/>
                   </a:solidFill>
@@ -1370,7 +1380,7 @@
             </a:ln>
             <a:extLst>
               <a:ext uri="{91240B29-F687-4f45-9708-019B960494DF}">
-                <a14:hiddenLine xmlns:a14="http://schemas.microsoft.com/office/drawing/2010/main" xmlns="" w="9525">
+                <a14:hiddenLine xmlns="" xmlns:a14="http://schemas.microsoft.com/office/drawing/2010/main" w="9525">
                   <a:solidFill>
                     <a:srgbClr val="000000"/>
                   </a:solidFill>
@@ -1460,7 +1470,7 @@
             </a:ln>
             <a:extLst>
               <a:ext uri="{91240B29-F687-4f45-9708-019B960494DF}">
-                <a14:hiddenLine xmlns:a14="http://schemas.microsoft.com/office/drawing/2010/main" xmlns="" w="9525">
+                <a14:hiddenLine xmlns="" xmlns:a14="http://schemas.microsoft.com/office/drawing/2010/main" w="9525">
                   <a:solidFill>
                     <a:srgbClr val="000000"/>
                   </a:solidFill>
@@ -1522,7 +1532,7 @@
             </a:ln>
             <a:extLst>
               <a:ext uri="{91240B29-F687-4f45-9708-019B960494DF}">
-                <a14:hiddenLine xmlns:a14="http://schemas.microsoft.com/office/drawing/2010/main" xmlns="" w="9525">
+                <a14:hiddenLine xmlns="" xmlns:a14="http://schemas.microsoft.com/office/drawing/2010/main" w="9525">
                   <a:solidFill>
                     <a:srgbClr val="000000"/>
                   </a:solidFill>
@@ -1612,7 +1622,7 @@
             </a:ln>
             <a:extLst>
               <a:ext uri="{91240B29-F687-4f45-9708-019B960494DF}">
-                <a14:hiddenLine xmlns:a14="http://schemas.microsoft.com/office/drawing/2010/main" xmlns="" w="9525">
+                <a14:hiddenLine xmlns="" xmlns:a14="http://schemas.microsoft.com/office/drawing/2010/main" w="9525">
                   <a:solidFill>
                     <a:srgbClr val="000000"/>
                   </a:solidFill>
@@ -1702,7 +1712,7 @@
             </a:ln>
             <a:extLst>
               <a:ext uri="{91240B29-F687-4f45-9708-019B960494DF}">
-                <a14:hiddenLine xmlns:a14="http://schemas.microsoft.com/office/drawing/2010/main" xmlns="" w="9525">
+                <a14:hiddenLine xmlns="" xmlns:a14="http://schemas.microsoft.com/office/drawing/2010/main" w="9525">
                   <a:solidFill>
                     <a:srgbClr val="000000"/>
                   </a:solidFill>
@@ -1758,7 +1768,7 @@
             </a:ln>
             <a:extLst>
               <a:ext uri="{91240B29-F687-4f45-9708-019B960494DF}">
-                <a14:hiddenLine xmlns:a14="http://schemas.microsoft.com/office/drawing/2010/main" xmlns="" w="9525">
+                <a14:hiddenLine xmlns="" xmlns:a14="http://schemas.microsoft.com/office/drawing/2010/main" w="9525">
                   <a:solidFill>
                     <a:srgbClr val="000000"/>
                   </a:solidFill>
@@ -1848,7 +1858,7 @@
             </a:ln>
             <a:extLst>
               <a:ext uri="{91240B29-F687-4f45-9708-019B960494DF}">
-                <a14:hiddenLine xmlns:a14="http://schemas.microsoft.com/office/drawing/2010/main" xmlns="" w="9525">
+                <a14:hiddenLine xmlns="" xmlns:a14="http://schemas.microsoft.com/office/drawing/2010/main" w="9525">
                   <a:solidFill>
                     <a:srgbClr val="000000"/>
                   </a:solidFill>
@@ -1904,7 +1914,7 @@
             </a:ln>
             <a:extLst>
               <a:ext uri="{91240B29-F687-4f45-9708-019B960494DF}">
-                <a14:hiddenLine xmlns:a14="http://schemas.microsoft.com/office/drawing/2010/main" xmlns="" w="9525">
+                <a14:hiddenLine xmlns="" xmlns:a14="http://schemas.microsoft.com/office/drawing/2010/main" w="9525">
                   <a:solidFill>
                     <a:srgbClr val="000000"/>
                   </a:solidFill>
@@ -1994,7 +2004,7 @@
             </a:ln>
             <a:extLst>
               <a:ext uri="{91240B29-F687-4f45-9708-019B960494DF}">
-                <a14:hiddenLine xmlns:a14="http://schemas.microsoft.com/office/drawing/2010/main" xmlns="" w="9525">
+                <a14:hiddenLine xmlns="" xmlns:a14="http://schemas.microsoft.com/office/drawing/2010/main" w="9525">
                   <a:solidFill>
                     <a:srgbClr val="000000"/>
                   </a:solidFill>
@@ -2062,7 +2072,7 @@
             </a:ln>
             <a:extLst>
               <a:ext uri="{91240B29-F687-4f45-9708-019B960494DF}">
-                <a14:hiddenLine xmlns:a14="http://schemas.microsoft.com/office/drawing/2010/main" xmlns="" w="9525">
+                <a14:hiddenLine xmlns="" xmlns:a14="http://schemas.microsoft.com/office/drawing/2010/main" w="9525">
                   <a:solidFill>
                     <a:srgbClr val="000000"/>
                   </a:solidFill>
@@ -2152,7 +2162,7 @@
             </a:ln>
             <a:extLst>
               <a:ext uri="{91240B29-F687-4f45-9708-019B960494DF}">
-                <a14:hiddenLine xmlns:a14="http://schemas.microsoft.com/office/drawing/2010/main" xmlns="" w="9525">
+                <a14:hiddenLine xmlns="" xmlns:a14="http://schemas.microsoft.com/office/drawing/2010/main" w="9525">
                   <a:solidFill>
                     <a:srgbClr val="000000"/>
                   </a:solidFill>
@@ -2220,7 +2230,7 @@
             </a:ln>
             <a:extLst>
               <a:ext uri="{91240B29-F687-4f45-9708-019B960494DF}">
-                <a14:hiddenLine xmlns:a14="http://schemas.microsoft.com/office/drawing/2010/main" xmlns="" w="9525">
+                <a14:hiddenLine xmlns="" xmlns:a14="http://schemas.microsoft.com/office/drawing/2010/main" w="9525">
                   <a:solidFill>
                     <a:srgbClr val="000000"/>
                   </a:solidFill>
@@ -2310,7 +2320,7 @@
             </a:ln>
             <a:extLst>
               <a:ext uri="{91240B29-F687-4f45-9708-019B960494DF}">
-                <a14:hiddenLine xmlns:a14="http://schemas.microsoft.com/office/drawing/2010/main" xmlns="" w="9525">
+                <a14:hiddenLine xmlns="" xmlns:a14="http://schemas.microsoft.com/office/drawing/2010/main" w="9525">
                   <a:solidFill>
                     <a:srgbClr val="000000"/>
                   </a:solidFill>
@@ -2344,7 +2354,7 @@
             </a:ln>
             <a:extLst>
               <a:ext uri="{91240B29-F687-4f45-9708-019B960494DF}">
-                <a14:hiddenLine xmlns:a14="http://schemas.microsoft.com/office/drawing/2010/main" xmlns="" w="9525">
+                <a14:hiddenLine xmlns="" xmlns:a14="http://schemas.microsoft.com/office/drawing/2010/main" w="9525">
                   <a:solidFill>
                     <a:srgbClr val="000000"/>
                   </a:solidFill>
@@ -2434,7 +2444,7 @@
             </a:ln>
             <a:extLst>
               <a:ext uri="{91240B29-F687-4f45-9708-019B960494DF}">
-                <a14:hiddenLine xmlns:a14="http://schemas.microsoft.com/office/drawing/2010/main" xmlns="" w="9525">
+                <a14:hiddenLine xmlns="" xmlns:a14="http://schemas.microsoft.com/office/drawing/2010/main" w="9525">
                   <a:solidFill>
                     <a:srgbClr val="000000"/>
                   </a:solidFill>
@@ -2496,7 +2506,7 @@
             </a:ln>
             <a:extLst>
               <a:ext uri="{91240B29-F687-4f45-9708-019B960494DF}">
-                <a14:hiddenLine xmlns:a14="http://schemas.microsoft.com/office/drawing/2010/main" xmlns="" w="9525">
+                <a14:hiddenLine xmlns="" xmlns:a14="http://schemas.microsoft.com/office/drawing/2010/main" w="9525">
                   <a:solidFill>
                     <a:srgbClr val="000000"/>
                   </a:solidFill>
@@ -2558,7 +2568,7 @@
             </a:ln>
             <a:extLst>
               <a:ext uri="{91240B29-F687-4f45-9708-019B960494DF}">
-                <a14:hiddenLine xmlns:a14="http://schemas.microsoft.com/office/drawing/2010/main" xmlns="" w="9525">
+                <a14:hiddenLine xmlns="" xmlns:a14="http://schemas.microsoft.com/office/drawing/2010/main" w="9525">
                   <a:solidFill>
                     <a:srgbClr val="000000"/>
                   </a:solidFill>
@@ -2648,7 +2658,7 @@
             </a:ln>
             <a:extLst>
               <a:ext uri="{91240B29-F687-4f45-9708-019B960494DF}">
-                <a14:hiddenLine xmlns:a14="http://schemas.microsoft.com/office/drawing/2010/main" xmlns="" w="9525">
+                <a14:hiddenLine xmlns="" xmlns:a14="http://schemas.microsoft.com/office/drawing/2010/main" w="9525">
                   <a:solidFill>
                     <a:srgbClr val="000000"/>
                   </a:solidFill>
@@ -2716,7 +2726,7 @@
             </a:ln>
             <a:extLst>
               <a:ext uri="{91240B29-F687-4f45-9708-019B960494DF}">
-                <a14:hiddenLine xmlns:a14="http://schemas.microsoft.com/office/drawing/2010/main" xmlns="" w="9525">
+                <a14:hiddenLine xmlns="" xmlns:a14="http://schemas.microsoft.com/office/drawing/2010/main" w="9525">
                   <a:solidFill>
                     <a:srgbClr val="000000"/>
                   </a:solidFill>
@@ -2778,7 +2788,7 @@
             </a:ln>
             <a:extLst>
               <a:ext uri="{91240B29-F687-4f45-9708-019B960494DF}">
-                <a14:hiddenLine xmlns:a14="http://schemas.microsoft.com/office/drawing/2010/main" xmlns="" w="9525">
+                <a14:hiddenLine xmlns="" xmlns:a14="http://schemas.microsoft.com/office/drawing/2010/main" w="9525">
                   <a:solidFill>
                     <a:srgbClr val="000000"/>
                   </a:solidFill>
@@ -2868,7 +2878,7 @@
             </a:ln>
             <a:extLst>
               <a:ext uri="{91240B29-F687-4f45-9708-019B960494DF}">
-                <a14:hiddenLine xmlns:a14="http://schemas.microsoft.com/office/drawing/2010/main" xmlns="" w="9525">
+                <a14:hiddenLine xmlns="" xmlns:a14="http://schemas.microsoft.com/office/drawing/2010/main" w="9525">
                   <a:solidFill>
                     <a:srgbClr val="000000"/>
                   </a:solidFill>
@@ -2930,7 +2940,7 @@
             </a:ln>
             <a:extLst>
               <a:ext uri="{91240B29-F687-4f45-9708-019B960494DF}">
-                <a14:hiddenLine xmlns:a14="http://schemas.microsoft.com/office/drawing/2010/main" xmlns="" w="9525">
+                <a14:hiddenLine xmlns="" xmlns:a14="http://schemas.microsoft.com/office/drawing/2010/main" w="9525">
                   <a:solidFill>
                     <a:srgbClr val="000000"/>
                   </a:solidFill>
@@ -3020,7 +3030,7 @@
             </a:ln>
             <a:extLst>
               <a:ext uri="{91240B29-F687-4f45-9708-019B960494DF}">
-                <a14:hiddenLine xmlns:a14="http://schemas.microsoft.com/office/drawing/2010/main" xmlns="" w="9525">
+                <a14:hiddenLine xmlns="" xmlns:a14="http://schemas.microsoft.com/office/drawing/2010/main" w="9525">
                   <a:solidFill>
                     <a:srgbClr val="000000"/>
                   </a:solidFill>
@@ -3082,7 +3092,7 @@
             </a:ln>
             <a:extLst>
               <a:ext uri="{91240B29-F687-4f45-9708-019B960494DF}">
-                <a14:hiddenLine xmlns:a14="http://schemas.microsoft.com/office/drawing/2010/main" xmlns="" w="9525">
+                <a14:hiddenLine xmlns="" xmlns:a14="http://schemas.microsoft.com/office/drawing/2010/main" w="9525">
                   <a:solidFill>
                     <a:srgbClr val="000000"/>
                   </a:solidFill>
@@ -3172,7 +3182,7 @@
             </a:ln>
             <a:extLst>
               <a:ext uri="{91240B29-F687-4f45-9708-019B960494DF}">
-                <a14:hiddenLine xmlns:a14="http://schemas.microsoft.com/office/drawing/2010/main" xmlns="" w="9525">
+                <a14:hiddenLine xmlns="" xmlns:a14="http://schemas.microsoft.com/office/drawing/2010/main" w="9525">
                   <a:solidFill>
                     <a:srgbClr val="000000"/>
                   </a:solidFill>
@@ -3206,7 +3216,7 @@
             </a:ln>
             <a:extLst>
               <a:ext uri="{91240B29-F687-4f45-9708-019B960494DF}">
-                <a14:hiddenLine xmlns:a14="http://schemas.microsoft.com/office/drawing/2010/main" xmlns="" w="9525">
+                <a14:hiddenLine xmlns="" xmlns:a14="http://schemas.microsoft.com/office/drawing/2010/main" w="9525">
                   <a:solidFill>
                     <a:srgbClr val="000000"/>
                   </a:solidFill>
@@ -3271,7 +3281,7 @@
             </a:ln>
             <a:extLst>
               <a:ext uri="{91240B29-F687-4f45-9708-019B960494DF}">
-                <a14:hiddenLine xmlns:a14="http://schemas.microsoft.com/office/drawing/2010/main" xmlns="" w="9525">
+                <a14:hiddenLine xmlns="" xmlns:a14="http://schemas.microsoft.com/office/drawing/2010/main" w="9525">
                   <a:solidFill>
                     <a:srgbClr val="000000"/>
                   </a:solidFill>
@@ -3361,7 +3371,7 @@
             </a:ln>
             <a:extLst>
               <a:ext uri="{91240B29-F687-4f45-9708-019B960494DF}">
-                <a14:hiddenLine xmlns:a14="http://schemas.microsoft.com/office/drawing/2010/main" xmlns="" w="9525">
+                <a14:hiddenLine xmlns="" xmlns:a14="http://schemas.microsoft.com/office/drawing/2010/main" w="9525">
                   <a:solidFill>
                     <a:srgbClr val="000000"/>
                   </a:solidFill>
@@ -3423,7 +3433,7 @@
             </a:ln>
             <a:extLst>
               <a:ext uri="{91240B29-F687-4f45-9708-019B960494DF}">
-                <a14:hiddenLine xmlns:a14="http://schemas.microsoft.com/office/drawing/2010/main" xmlns="" w="9525">
+                <a14:hiddenLine xmlns="" xmlns:a14="http://schemas.microsoft.com/office/drawing/2010/main" w="9525">
                   <a:solidFill>
                     <a:srgbClr val="000000"/>
                   </a:solidFill>
@@ -3513,7 +3523,7 @@
             </a:ln>
             <a:extLst>
               <a:ext uri="{91240B29-F687-4f45-9708-019B960494DF}">
-                <a14:hiddenLine xmlns:a14="http://schemas.microsoft.com/office/drawing/2010/main" xmlns="" w="9525">
+                <a14:hiddenLine xmlns="" xmlns:a14="http://schemas.microsoft.com/office/drawing/2010/main" w="9525">
                   <a:solidFill>
                     <a:srgbClr val="000000"/>
                   </a:solidFill>
@@ -3603,7 +3613,7 @@
             </a:ln>
             <a:extLst>
               <a:ext uri="{91240B29-F687-4f45-9708-019B960494DF}">
-                <a14:hiddenLine xmlns:a14="http://schemas.microsoft.com/office/drawing/2010/main" xmlns="" w="9525">
+                <a14:hiddenLine xmlns="" xmlns:a14="http://schemas.microsoft.com/office/drawing/2010/main" w="9525">
                   <a:solidFill>
                     <a:srgbClr val="000000"/>
                   </a:solidFill>
@@ -3668,7 +3678,7 @@
             </a:ln>
             <a:extLst>
               <a:ext uri="{91240B29-F687-4f45-9708-019B960494DF}">
-                <a14:hiddenLine xmlns:a14="http://schemas.microsoft.com/office/drawing/2010/main" xmlns="" w="9525">
+                <a14:hiddenLine xmlns="" xmlns:a14="http://schemas.microsoft.com/office/drawing/2010/main" w="9525">
                   <a:solidFill>
                     <a:srgbClr val="000000"/>
                   </a:solidFill>
@@ -3730,7 +3740,7 @@
             </a:ln>
             <a:extLst>
               <a:ext uri="{91240B29-F687-4f45-9708-019B960494DF}">
-                <a14:hiddenLine xmlns:a14="http://schemas.microsoft.com/office/drawing/2010/main" xmlns="" w="9525">
+                <a14:hiddenLine xmlns="" xmlns:a14="http://schemas.microsoft.com/office/drawing/2010/main" w="9525">
                   <a:solidFill>
                     <a:srgbClr val="000000"/>
                   </a:solidFill>
@@ -3820,7 +3830,7 @@
             </a:ln>
             <a:extLst>
               <a:ext uri="{91240B29-F687-4f45-9708-019B960494DF}">
-                <a14:hiddenLine xmlns:a14="http://schemas.microsoft.com/office/drawing/2010/main" xmlns="" w="9525">
+                <a14:hiddenLine xmlns="" xmlns:a14="http://schemas.microsoft.com/office/drawing/2010/main" w="9525">
                   <a:solidFill>
                     <a:srgbClr val="000000"/>
                   </a:solidFill>
@@ -3910,7 +3920,7 @@
             </a:ln>
             <a:extLst>
               <a:ext uri="{91240B29-F687-4f45-9708-019B960494DF}">
-                <a14:hiddenLine xmlns:a14="http://schemas.microsoft.com/office/drawing/2010/main" xmlns="" w="9525">
+                <a14:hiddenLine xmlns="" xmlns:a14="http://schemas.microsoft.com/office/drawing/2010/main" w="9525">
                   <a:solidFill>
                     <a:srgbClr val="000000"/>
                   </a:solidFill>
@@ -3972,7 +3982,7 @@
             </a:ln>
             <a:extLst>
               <a:ext uri="{91240B29-F687-4f45-9708-019B960494DF}">
-                <a14:hiddenLine xmlns:a14="http://schemas.microsoft.com/office/drawing/2010/main" xmlns="" w="9525">
+                <a14:hiddenLine xmlns="" xmlns:a14="http://schemas.microsoft.com/office/drawing/2010/main" w="9525">
                   <a:solidFill>
                     <a:srgbClr val="000000"/>
                   </a:solidFill>
@@ -4092,7 +4102,7 @@
             </a:ln>
             <a:extLst>
               <a:ext uri="{91240B29-F687-4f45-9708-019B960494DF}">
-                <a14:hiddenLine xmlns:a14="http://schemas.microsoft.com/office/drawing/2010/main" xmlns="" w="9525">
+                <a14:hiddenLine xmlns="" xmlns:a14="http://schemas.microsoft.com/office/drawing/2010/main" w="9525">
                   <a:solidFill>
                     <a:srgbClr val="000000"/>
                   </a:solidFill>
@@ -4160,7 +4170,7 @@
             </a:ln>
             <a:extLst>
               <a:ext uri="{91240B29-F687-4f45-9708-019B960494DF}">
-                <a14:hiddenLine xmlns:a14="http://schemas.microsoft.com/office/drawing/2010/main" xmlns="" w="9525">
+                <a14:hiddenLine xmlns="" xmlns:a14="http://schemas.microsoft.com/office/drawing/2010/main" w="9525">
                   <a:solidFill>
                     <a:srgbClr val="000000"/>
                   </a:solidFill>
@@ -4250,7 +4260,7 @@
             </a:ln>
             <a:extLst>
               <a:ext uri="{91240B29-F687-4f45-9708-019B960494DF}">
-                <a14:hiddenLine xmlns:a14="http://schemas.microsoft.com/office/drawing/2010/main" xmlns="" w="9525">
+                <a14:hiddenLine xmlns="" xmlns:a14="http://schemas.microsoft.com/office/drawing/2010/main" w="9525">
                   <a:solidFill>
                     <a:srgbClr val="000000"/>
                   </a:solidFill>
@@ -4390,7 +4400,7 @@
           <a:p>
             <a:fld id="{48A87A34-81AB-432B-8DAE-1953F412C126}" type="datetimeFigureOut">
               <a:rPr lang="en-US" dirty="0"/>
-              <a:t>3/11/2020</a:t>
+              <a:t>3/16/2020</a:t>
             </a:fld>
             <a:endParaRPr lang="en-US" dirty="0"/>
           </a:p>
@@ -4652,7 +4662,7 @@
           <a:p>
             <a:fld id="{48A87A34-81AB-432B-8DAE-1953F412C126}" type="datetimeFigureOut">
               <a:rPr lang="en-US" dirty="0"/>
-              <a:t>3/11/2020</a:t>
+              <a:t>3/16/2020</a:t>
             </a:fld>
             <a:endParaRPr lang="en-US" dirty="0"/>
           </a:p>
@@ -4843,7 +4853,7 @@
           <a:p>
             <a:fld id="{48A87A34-81AB-432B-8DAE-1953F412C126}" type="datetimeFigureOut">
               <a:rPr lang="en-US" dirty="0"/>
-              <a:t>3/11/2020</a:t>
+              <a:t>3/16/2020</a:t>
             </a:fld>
             <a:endParaRPr lang="en-US" dirty="0"/>
           </a:p>
@@ -5101,7 +5111,7 @@
           <a:p>
             <a:fld id="{48A87A34-81AB-432B-8DAE-1953F412C126}" type="datetimeFigureOut">
               <a:rPr lang="en-US" dirty="0"/>
-              <a:t>3/11/2020</a:t>
+              <a:t>3/16/2020</a:t>
             </a:fld>
             <a:endParaRPr lang="en-US" dirty="0"/>
           </a:p>
@@ -5530,7 +5540,7 @@
           <a:p>
             <a:fld id="{48A87A34-81AB-432B-8DAE-1953F412C126}" type="datetimeFigureOut">
               <a:rPr lang="en-US" dirty="0"/>
-              <a:t>3/11/2020</a:t>
+              <a:t>3/16/2020</a:t>
             </a:fld>
             <a:endParaRPr lang="en-US" dirty="0"/>
           </a:p>
@@ -6071,7 +6081,7 @@
           <a:p>
             <a:fld id="{48A87A34-81AB-432B-8DAE-1953F412C126}" type="datetimeFigureOut">
               <a:rPr lang="en-US" dirty="0"/>
-              <a:t>3/11/2020</a:t>
+              <a:t>3/16/2020</a:t>
             </a:fld>
             <a:endParaRPr lang="en-US" dirty="0"/>
           </a:p>
@@ -6786,7 +6796,7 @@
           <a:p>
             <a:fld id="{48A87A34-81AB-432B-8DAE-1953F412C126}" type="datetimeFigureOut">
               <a:rPr lang="en-US" dirty="0"/>
-              <a:t>3/11/2020</a:t>
+              <a:t>3/16/2020</a:t>
             </a:fld>
             <a:endParaRPr lang="en-US" dirty="0"/>
           </a:p>
@@ -6951,7 +6961,7 @@
           <a:p>
             <a:fld id="{48A87A34-81AB-432B-8DAE-1953F412C126}" type="datetimeFigureOut">
               <a:rPr lang="en-US" dirty="0"/>
-              <a:t>3/11/2020</a:t>
+              <a:t>3/16/2020</a:t>
             </a:fld>
             <a:endParaRPr lang="en-US" dirty="0"/>
           </a:p>
@@ -7126,7 +7136,7 @@
           <a:p>
             <a:fld id="{48A87A34-81AB-432B-8DAE-1953F412C126}" type="datetimeFigureOut">
               <a:rPr lang="en-US" dirty="0"/>
-              <a:t>3/11/2020</a:t>
+              <a:t>3/16/2020</a:t>
             </a:fld>
             <a:endParaRPr lang="en-US" dirty="0"/>
           </a:p>
@@ -7291,7 +7301,7 @@
           <a:p>
             <a:fld id="{48A87A34-81AB-432B-8DAE-1953F412C126}" type="datetimeFigureOut">
               <a:rPr lang="en-US" dirty="0"/>
-              <a:t>3/11/2020</a:t>
+              <a:t>3/16/2020</a:t>
             </a:fld>
             <a:endParaRPr lang="en-US" dirty="0"/>
           </a:p>
@@ -7536,7 +7546,7 @@
           <a:p>
             <a:fld id="{48A87A34-81AB-432B-8DAE-1953F412C126}" type="datetimeFigureOut">
               <a:rPr lang="en-US" dirty="0"/>
-              <a:t>3/11/2020</a:t>
+              <a:t>3/16/2020</a:t>
             </a:fld>
             <a:endParaRPr lang="en-US" dirty="0"/>
           </a:p>
@@ -7763,7 +7773,7 @@
           <a:p>
             <a:fld id="{48A87A34-81AB-432B-8DAE-1953F412C126}" type="datetimeFigureOut">
               <a:rPr lang="en-US" dirty="0"/>
-              <a:t>3/11/2020</a:t>
+              <a:t>3/16/2020</a:t>
             </a:fld>
             <a:endParaRPr lang="en-US" dirty="0"/>
           </a:p>
@@ -8139,7 +8149,7 @@
           <a:p>
             <a:fld id="{48A87A34-81AB-432B-8DAE-1953F412C126}" type="datetimeFigureOut">
               <a:rPr lang="en-US" dirty="0"/>
-              <a:t>3/11/2020</a:t>
+              <a:t>3/16/2020</a:t>
             </a:fld>
             <a:endParaRPr lang="en-US" dirty="0"/>
           </a:p>
@@ -8252,7 +8262,7 @@
           <a:p>
             <a:fld id="{48A87A34-81AB-432B-8DAE-1953F412C126}" type="datetimeFigureOut">
               <a:rPr lang="en-US" dirty="0"/>
-              <a:t>3/11/2020</a:t>
+              <a:t>3/16/2020</a:t>
             </a:fld>
             <a:endParaRPr lang="en-US" dirty="0"/>
           </a:p>
@@ -8342,7 +8352,7 @@
           <a:p>
             <a:fld id="{48A87A34-81AB-432B-8DAE-1953F412C126}" type="datetimeFigureOut">
               <a:rPr lang="en-US" dirty="0"/>
-              <a:t>3/11/2020</a:t>
+              <a:t>3/16/2020</a:t>
             </a:fld>
             <a:endParaRPr lang="en-US" dirty="0"/>
           </a:p>
@@ -8586,7 +8596,7 @@
           <a:p>
             <a:fld id="{48A87A34-81AB-432B-8DAE-1953F412C126}" type="datetimeFigureOut">
               <a:rPr lang="en-US" dirty="0"/>
-              <a:t>3/11/2020</a:t>
+              <a:t>3/16/2020</a:t>
             </a:fld>
             <a:endParaRPr lang="en-US" dirty="0"/>
           </a:p>
@@ -8861,7 +8871,7 @@
           <a:p>
             <a:fld id="{48A87A34-81AB-432B-8DAE-1953F412C126}" type="datetimeFigureOut">
               <a:rPr lang="en-US" dirty="0"/>
-              <a:t>3/11/2020</a:t>
+              <a:t>3/16/2020</a:t>
             </a:fld>
             <a:endParaRPr lang="en-US" dirty="0"/>
           </a:p>
@@ -8972,7 +8982,7 @@
           <a:noFill/>
           <a:extLst>
             <a:ext uri="{909E8E84-426E-40dd-AFC4-6F175D3DCCD1}">
-              <a14:hiddenFill xmlns:a14="http://schemas.microsoft.com/office/drawing/2010/main" xmlns="">
+              <a14:hiddenFill xmlns="" xmlns:a14="http://schemas.microsoft.com/office/drawing/2010/main">
                 <a:solidFill>
                   <a:srgbClr val="FFFFFF"/>
                 </a:solidFill>
@@ -9046,7 +9056,7 @@
               </a:ln>
               <a:extLst>
                 <a:ext uri="{91240B29-F687-4f45-9708-019B960494DF}">
-                  <a14:hiddenLine xmlns:a14="http://schemas.microsoft.com/office/drawing/2010/main" xmlns="" w="9525">
+                  <a14:hiddenLine xmlns="" xmlns:a14="http://schemas.microsoft.com/office/drawing/2010/main" w="9525">
                     <a:solidFill>
                       <a:srgbClr val="000000"/>
                     </a:solidFill>
@@ -9136,7 +9146,7 @@
               </a:ln>
               <a:extLst>
                 <a:ext uri="{91240B29-F687-4f45-9708-019B960494DF}">
-                  <a14:hiddenLine xmlns:a14="http://schemas.microsoft.com/office/drawing/2010/main" xmlns="" w="9525">
+                  <a14:hiddenLine xmlns="" xmlns:a14="http://schemas.microsoft.com/office/drawing/2010/main" w="9525">
                     <a:solidFill>
                       <a:srgbClr val="000000"/>
                     </a:solidFill>
@@ -9226,7 +9236,7 @@
               </a:ln>
               <a:extLst>
                 <a:ext uri="{91240B29-F687-4f45-9708-019B960494DF}">
-                  <a14:hiddenLine xmlns:a14="http://schemas.microsoft.com/office/drawing/2010/main" xmlns="" w="9525">
+                  <a14:hiddenLine xmlns="" xmlns:a14="http://schemas.microsoft.com/office/drawing/2010/main" w="9525">
                     <a:solidFill>
                       <a:srgbClr val="000000"/>
                     </a:solidFill>
@@ -9288,7 +9298,7 @@
               </a:ln>
               <a:extLst>
                 <a:ext uri="{91240B29-F687-4f45-9708-019B960494DF}">
-                  <a14:hiddenLine xmlns:a14="http://schemas.microsoft.com/office/drawing/2010/main" xmlns="" w="9525">
+                  <a14:hiddenLine xmlns="" xmlns:a14="http://schemas.microsoft.com/office/drawing/2010/main" w="9525">
                     <a:solidFill>
                       <a:srgbClr val="000000"/>
                     </a:solidFill>
@@ -9378,7 +9388,7 @@
               </a:ln>
               <a:extLst>
                 <a:ext uri="{91240B29-F687-4f45-9708-019B960494DF}">
-                  <a14:hiddenLine xmlns:a14="http://schemas.microsoft.com/office/drawing/2010/main" xmlns="" w="9525">
+                  <a14:hiddenLine xmlns="" xmlns:a14="http://schemas.microsoft.com/office/drawing/2010/main" w="9525">
                     <a:solidFill>
                       <a:srgbClr val="000000"/>
                     </a:solidFill>
@@ -9440,7 +9450,7 @@
               </a:ln>
               <a:extLst>
                 <a:ext uri="{91240B29-F687-4f45-9708-019B960494DF}">
-                  <a14:hiddenLine xmlns:a14="http://schemas.microsoft.com/office/drawing/2010/main" xmlns="" w="9525">
+                  <a14:hiddenLine xmlns="" xmlns:a14="http://schemas.microsoft.com/office/drawing/2010/main" w="9525">
                     <a:solidFill>
                       <a:srgbClr val="000000"/>
                     </a:solidFill>
@@ -9502,7 +9512,7 @@
               </a:ln>
               <a:extLst>
                 <a:ext uri="{91240B29-F687-4f45-9708-019B960494DF}">
-                  <a14:hiddenLine xmlns:a14="http://schemas.microsoft.com/office/drawing/2010/main" xmlns="" w="9525">
+                  <a14:hiddenLine xmlns="" xmlns:a14="http://schemas.microsoft.com/office/drawing/2010/main" w="9525">
                     <a:solidFill>
                       <a:srgbClr val="000000"/>
                     </a:solidFill>
@@ -9592,7 +9602,7 @@
               </a:ln>
               <a:extLst>
                 <a:ext uri="{91240B29-F687-4f45-9708-019B960494DF}">
-                  <a14:hiddenLine xmlns:a14="http://schemas.microsoft.com/office/drawing/2010/main" xmlns="" w="9525">
+                  <a14:hiddenLine xmlns="" xmlns:a14="http://schemas.microsoft.com/office/drawing/2010/main" w="9525">
                     <a:solidFill>
                       <a:srgbClr val="000000"/>
                     </a:solidFill>
@@ -9682,7 +9692,7 @@
               </a:ln>
               <a:extLst>
                 <a:ext uri="{91240B29-F687-4f45-9708-019B960494DF}">
-                  <a14:hiddenLine xmlns:a14="http://schemas.microsoft.com/office/drawing/2010/main" xmlns="" w="9525">
+                  <a14:hiddenLine xmlns="" xmlns:a14="http://schemas.microsoft.com/office/drawing/2010/main" w="9525">
                     <a:solidFill>
                       <a:srgbClr val="000000"/>
                     </a:solidFill>
@@ -9744,7 +9754,7 @@
               </a:ln>
               <a:extLst>
                 <a:ext uri="{91240B29-F687-4f45-9708-019B960494DF}">
-                  <a14:hiddenLine xmlns:a14="http://schemas.microsoft.com/office/drawing/2010/main" xmlns="" w="9525">
+                  <a14:hiddenLine xmlns="" xmlns:a14="http://schemas.microsoft.com/office/drawing/2010/main" w="9525">
                     <a:solidFill>
                       <a:srgbClr val="000000"/>
                     </a:solidFill>
@@ -9854,7 +9864,7 @@
               </a:ln>
               <a:extLst>
                 <a:ext uri="{91240B29-F687-4f45-9708-019B960494DF}">
-                  <a14:hiddenLine xmlns:a14="http://schemas.microsoft.com/office/drawing/2010/main" xmlns="" w="9525">
+                  <a14:hiddenLine xmlns="" xmlns:a14="http://schemas.microsoft.com/office/drawing/2010/main" w="9525">
                     <a:solidFill>
                       <a:srgbClr val="000000"/>
                     </a:solidFill>
@@ -9938,7 +9948,7 @@
               </a:ln>
               <a:extLst>
                 <a:ext uri="{91240B29-F687-4f45-9708-019B960494DF}">
-                  <a14:hiddenLine xmlns:a14="http://schemas.microsoft.com/office/drawing/2010/main" xmlns="" w="9525">
+                  <a14:hiddenLine xmlns="" xmlns:a14="http://schemas.microsoft.com/office/drawing/2010/main" w="9525">
                     <a:solidFill>
                       <a:srgbClr val="000000"/>
                     </a:solidFill>
@@ -10000,7 +10010,7 @@
               </a:ln>
               <a:extLst>
                 <a:ext uri="{91240B29-F687-4f45-9708-019B960494DF}">
-                  <a14:hiddenLine xmlns:a14="http://schemas.microsoft.com/office/drawing/2010/main" xmlns="" w="9525">
+                  <a14:hiddenLine xmlns="" xmlns:a14="http://schemas.microsoft.com/office/drawing/2010/main" w="9525">
                     <a:solidFill>
                       <a:srgbClr val="000000"/>
                     </a:solidFill>
@@ -10062,7 +10072,7 @@
               </a:ln>
               <a:extLst>
                 <a:ext uri="{91240B29-F687-4f45-9708-019B960494DF}">
-                  <a14:hiddenLine xmlns:a14="http://schemas.microsoft.com/office/drawing/2010/main" xmlns="" w="9525">
+                  <a14:hiddenLine xmlns="" xmlns:a14="http://schemas.microsoft.com/office/drawing/2010/main" w="9525">
                     <a:solidFill>
                       <a:srgbClr val="000000"/>
                     </a:solidFill>
@@ -10152,7 +10162,7 @@
               </a:ln>
               <a:extLst>
                 <a:ext uri="{91240B29-F687-4f45-9708-019B960494DF}">
-                  <a14:hiddenLine xmlns:a14="http://schemas.microsoft.com/office/drawing/2010/main" xmlns="" w="9525">
+                  <a14:hiddenLine xmlns="" xmlns:a14="http://schemas.microsoft.com/office/drawing/2010/main" w="9525">
                     <a:solidFill>
                       <a:srgbClr val="000000"/>
                     </a:solidFill>
@@ -10186,7 +10196,7 @@
               </a:ln>
               <a:extLst>
                 <a:ext uri="{91240B29-F687-4f45-9708-019B960494DF}">
-                  <a14:hiddenLine xmlns:a14="http://schemas.microsoft.com/office/drawing/2010/main" xmlns="" w="9525">
+                  <a14:hiddenLine xmlns="" xmlns:a14="http://schemas.microsoft.com/office/drawing/2010/main" w="9525">
                     <a:solidFill>
                       <a:srgbClr val="000000"/>
                     </a:solidFill>
@@ -10251,7 +10261,7 @@
               </a:ln>
               <a:extLst>
                 <a:ext uri="{91240B29-F687-4f45-9708-019B960494DF}">
-                  <a14:hiddenLine xmlns:a14="http://schemas.microsoft.com/office/drawing/2010/main" xmlns="" w="9525">
+                  <a14:hiddenLine xmlns="" xmlns:a14="http://schemas.microsoft.com/office/drawing/2010/main" w="9525">
                     <a:solidFill>
                       <a:srgbClr val="000000"/>
                     </a:solidFill>
@@ -10341,7 +10351,7 @@
               </a:ln>
               <a:extLst>
                 <a:ext uri="{91240B29-F687-4f45-9708-019B960494DF}">
-                  <a14:hiddenLine xmlns:a14="http://schemas.microsoft.com/office/drawing/2010/main" xmlns="" w="9525">
+                  <a14:hiddenLine xmlns="" xmlns:a14="http://schemas.microsoft.com/office/drawing/2010/main" w="9525">
                     <a:solidFill>
                       <a:srgbClr val="000000"/>
                     </a:solidFill>
@@ -10403,7 +10413,7 @@
               </a:ln>
               <a:extLst>
                 <a:ext uri="{91240B29-F687-4f45-9708-019B960494DF}">
-                  <a14:hiddenLine xmlns:a14="http://schemas.microsoft.com/office/drawing/2010/main" xmlns="" w="9525">
+                  <a14:hiddenLine xmlns="" xmlns:a14="http://schemas.microsoft.com/office/drawing/2010/main" w="9525">
                     <a:solidFill>
                       <a:srgbClr val="000000"/>
                     </a:solidFill>
@@ -10493,7 +10503,7 @@
               </a:ln>
               <a:extLst>
                 <a:ext uri="{91240B29-F687-4f45-9708-019B960494DF}">
-                  <a14:hiddenLine xmlns:a14="http://schemas.microsoft.com/office/drawing/2010/main" xmlns="" w="9525">
+                  <a14:hiddenLine xmlns="" xmlns:a14="http://schemas.microsoft.com/office/drawing/2010/main" w="9525">
                     <a:solidFill>
                       <a:srgbClr val="000000"/>
                     </a:solidFill>
@@ -10558,7 +10568,7 @@
               </a:ln>
               <a:extLst>
                 <a:ext uri="{91240B29-F687-4f45-9708-019B960494DF}">
-                  <a14:hiddenLine xmlns:a14="http://schemas.microsoft.com/office/drawing/2010/main" xmlns="" w="9525">
+                  <a14:hiddenLine xmlns="" xmlns:a14="http://schemas.microsoft.com/office/drawing/2010/main" w="9525">
                     <a:solidFill>
                       <a:srgbClr val="000000"/>
                     </a:solidFill>
@@ -10620,7 +10630,7 @@
               </a:ln>
               <a:extLst>
                 <a:ext uri="{91240B29-F687-4f45-9708-019B960494DF}">
-                  <a14:hiddenLine xmlns:a14="http://schemas.microsoft.com/office/drawing/2010/main" xmlns="" w="9525">
+                  <a14:hiddenLine xmlns="" xmlns:a14="http://schemas.microsoft.com/office/drawing/2010/main" w="9525">
                     <a:solidFill>
                       <a:srgbClr val="000000"/>
                     </a:solidFill>
@@ -10710,7 +10720,7 @@
               </a:ln>
               <a:extLst>
                 <a:ext uri="{91240B29-F687-4f45-9708-019B960494DF}">
-                  <a14:hiddenLine xmlns:a14="http://schemas.microsoft.com/office/drawing/2010/main" xmlns="" w="9525">
+                  <a14:hiddenLine xmlns="" xmlns:a14="http://schemas.microsoft.com/office/drawing/2010/main" w="9525">
                     <a:solidFill>
                       <a:srgbClr val="000000"/>
                     </a:solidFill>
@@ -10800,7 +10810,7 @@
               </a:ln>
               <a:extLst>
                 <a:ext uri="{91240B29-F687-4f45-9708-019B960494DF}">
-                  <a14:hiddenLine xmlns:a14="http://schemas.microsoft.com/office/drawing/2010/main" xmlns="" w="9525">
+                  <a14:hiddenLine xmlns="" xmlns:a14="http://schemas.microsoft.com/office/drawing/2010/main" w="9525">
                     <a:solidFill>
                       <a:srgbClr val="000000"/>
                     </a:solidFill>
@@ -10865,7 +10875,7 @@
               </a:ln>
               <a:extLst>
                 <a:ext uri="{91240B29-F687-4f45-9708-019B960494DF}">
-                  <a14:hiddenLine xmlns:a14="http://schemas.microsoft.com/office/drawing/2010/main" xmlns="" w="9525">
+                  <a14:hiddenLine xmlns="" xmlns:a14="http://schemas.microsoft.com/office/drawing/2010/main" w="9525">
                     <a:solidFill>
                       <a:srgbClr val="000000"/>
                     </a:solidFill>
@@ -10985,7 +10995,7 @@
               </a:ln>
               <a:extLst>
                 <a:ext uri="{91240B29-F687-4f45-9708-019B960494DF}">
-                  <a14:hiddenLine xmlns:a14="http://schemas.microsoft.com/office/drawing/2010/main" xmlns="" w="9525">
+                  <a14:hiddenLine xmlns="" xmlns:a14="http://schemas.microsoft.com/office/drawing/2010/main" w="9525">
                     <a:solidFill>
                       <a:srgbClr val="000000"/>
                     </a:solidFill>
@@ -11083,7 +11093,7 @@
               </a:ln>
               <a:extLst>
                 <a:ext uri="{91240B29-F687-4f45-9708-019B960494DF}">
-                  <a14:hiddenLine xmlns:a14="http://schemas.microsoft.com/office/drawing/2010/main" xmlns="" w="9525">
+                  <a14:hiddenLine xmlns="" xmlns:a14="http://schemas.microsoft.com/office/drawing/2010/main" w="9525">
                     <a:solidFill>
                       <a:srgbClr val="000000"/>
                     </a:solidFill>
@@ -11198,7 +11208,7 @@
               </a:ln>
               <a:extLst>
                 <a:ext uri="{91240B29-F687-4f45-9708-019B960494DF}">
-                  <a14:hiddenLine xmlns:a14="http://schemas.microsoft.com/office/drawing/2010/main" xmlns="" w="9525">
+                  <a14:hiddenLine xmlns="" xmlns:a14="http://schemas.microsoft.com/office/drawing/2010/main" w="9525">
                     <a:solidFill>
                       <a:srgbClr val="000000"/>
                     </a:solidFill>
@@ -11288,7 +11298,7 @@
               </a:ln>
               <a:extLst>
                 <a:ext uri="{91240B29-F687-4f45-9708-019B960494DF}">
-                  <a14:hiddenLine xmlns:a14="http://schemas.microsoft.com/office/drawing/2010/main" xmlns="" w="9525">
+                  <a14:hiddenLine xmlns="" xmlns:a14="http://schemas.microsoft.com/office/drawing/2010/main" w="9525">
                     <a:solidFill>
                       <a:srgbClr val="000000"/>
                     </a:solidFill>
@@ -11353,7 +11363,7 @@
               </a:ln>
               <a:extLst>
                 <a:ext uri="{91240B29-F687-4f45-9708-019B960494DF}">
-                  <a14:hiddenLine xmlns:a14="http://schemas.microsoft.com/office/drawing/2010/main" xmlns="" w="9525">
+                  <a14:hiddenLine xmlns="" xmlns:a14="http://schemas.microsoft.com/office/drawing/2010/main" w="9525">
                     <a:solidFill>
                       <a:srgbClr val="000000"/>
                     </a:solidFill>
@@ -11443,7 +11453,7 @@
               </a:ln>
               <a:extLst>
                 <a:ext uri="{91240B29-F687-4f45-9708-019B960494DF}">
-                  <a14:hiddenLine xmlns:a14="http://schemas.microsoft.com/office/drawing/2010/main" xmlns="" w="9525">
+                  <a14:hiddenLine xmlns="" xmlns:a14="http://schemas.microsoft.com/office/drawing/2010/main" w="9525">
                     <a:solidFill>
                       <a:srgbClr val="000000"/>
                     </a:solidFill>
@@ -11511,7 +11521,7 @@
               </a:ln>
               <a:extLst>
                 <a:ext uri="{91240B29-F687-4f45-9708-019B960494DF}">
-                  <a14:hiddenLine xmlns:a14="http://schemas.microsoft.com/office/drawing/2010/main" xmlns="" w="9525">
+                  <a14:hiddenLine xmlns="" xmlns:a14="http://schemas.microsoft.com/office/drawing/2010/main" w="9525">
                     <a:solidFill>
                       <a:srgbClr val="000000"/>
                     </a:solidFill>
@@ -11601,7 +11611,7 @@
               </a:ln>
               <a:extLst>
                 <a:ext uri="{91240B29-F687-4f45-9708-019B960494DF}">
-                  <a14:hiddenLine xmlns:a14="http://schemas.microsoft.com/office/drawing/2010/main" xmlns="" w="9525">
+                  <a14:hiddenLine xmlns="" xmlns:a14="http://schemas.microsoft.com/office/drawing/2010/main" w="9525">
                     <a:solidFill>
                       <a:srgbClr val="000000"/>
                     </a:solidFill>
@@ -11669,7 +11679,7 @@
               </a:ln>
               <a:extLst>
                 <a:ext uri="{91240B29-F687-4f45-9708-019B960494DF}">
-                  <a14:hiddenLine xmlns:a14="http://schemas.microsoft.com/office/drawing/2010/main" xmlns="" w="9525">
+                  <a14:hiddenLine xmlns="" xmlns:a14="http://schemas.microsoft.com/office/drawing/2010/main" w="9525">
                     <a:solidFill>
                       <a:srgbClr val="000000"/>
                     </a:solidFill>
@@ -11759,7 +11769,7 @@
               </a:ln>
               <a:extLst>
                 <a:ext uri="{91240B29-F687-4f45-9708-019B960494DF}">
-                  <a14:hiddenLine xmlns:a14="http://schemas.microsoft.com/office/drawing/2010/main" xmlns="" w="9525">
+                  <a14:hiddenLine xmlns="" xmlns:a14="http://schemas.microsoft.com/office/drawing/2010/main" w="9525">
                     <a:solidFill>
                       <a:srgbClr val="000000"/>
                     </a:solidFill>
@@ -11793,7 +11803,7 @@
               </a:ln>
               <a:extLst>
                 <a:ext uri="{91240B29-F687-4f45-9708-019B960494DF}">
-                  <a14:hiddenLine xmlns:a14="http://schemas.microsoft.com/office/drawing/2010/main" xmlns="" w="9525">
+                  <a14:hiddenLine xmlns="" xmlns:a14="http://schemas.microsoft.com/office/drawing/2010/main" w="9525">
                     <a:solidFill>
                       <a:srgbClr val="000000"/>
                     </a:solidFill>
@@ -11934,7 +11944,7 @@
             <a:fld id="{48A87A34-81AB-432B-8DAE-1953F412C126}" type="datetimeFigureOut">
               <a:rPr lang="en-US" dirty="0"/>
               <a:pPr/>
-              <a:t>3/11/2020</a:t>
+              <a:t>3/16/2020</a:t>
             </a:fld>
             <a:endParaRPr lang="en-US" dirty="0"/>
           </a:p>
@@ -12410,7 +12420,7 @@
             </a:r>
             <a:r>
               <a:rPr lang="en-IE" dirty="0" err="1"/>
-              <a:t>Gitfub</a:t>
+              <a:t>Github</a:t>
             </a:r>
             <a:r>
               <a:rPr lang="en-IE" dirty="0"/>
@@ -12430,6 +12440,589 @@
     <p:extLst>
       <p:ext uri="{BB962C8B-B14F-4D97-AF65-F5344CB8AC3E}">
         <p14:creationId xmlns:p14="http://schemas.microsoft.com/office/powerpoint/2010/main" val="1211589362"/>
+      </p:ext>
+    </p:extLst>
+  </p:cSld>
+  <p:clrMapOvr>
+    <a:masterClrMapping/>
+  </p:clrMapOvr>
+</p:sld>
+</file>
+
+<file path=ppt/slides/slide10.xml><?xml version="1.0" encoding="utf-8"?>
+<p:sld xmlns:a="http://schemas.openxmlformats.org/drawingml/2006/main" xmlns:r="http://schemas.openxmlformats.org/officeDocument/2006/relationships" xmlns:p="http://schemas.openxmlformats.org/presentationml/2006/main">
+  <p:cSld>
+    <p:spTree>
+      <p:nvGrpSpPr>
+        <p:cNvPr id="1" name=""/>
+        <p:cNvGrpSpPr/>
+        <p:nvPr/>
+      </p:nvGrpSpPr>
+      <p:grpSpPr>
+        <a:xfrm>
+          <a:off x="0" y="0"/>
+          <a:ext cx="0" cy="0"/>
+          <a:chOff x="0" y="0"/>
+          <a:chExt cx="0" cy="0"/>
+        </a:xfrm>
+      </p:grpSpPr>
+      <p:sp>
+        <p:nvSpPr>
+          <p:cNvPr id="2" name="Title 1">
+            <a:extLst>
+              <a:ext uri="{FF2B5EF4-FFF2-40B4-BE49-F238E27FC236}">
+                <a16:creationId xmlns:a16="http://schemas.microsoft.com/office/drawing/2014/main" id="{5C58EFF1-843F-4F54-B8EB-E5B77FBA2F7F}"/>
+              </a:ext>
+            </a:extLst>
+          </p:cNvPr>
+          <p:cNvSpPr>
+            <a:spLocks noGrp="1"/>
+          </p:cNvSpPr>
+          <p:nvPr>
+            <p:ph type="title"/>
+          </p:nvPr>
+        </p:nvSpPr>
+        <p:spPr/>
+        <p:txBody>
+          <a:bodyPr/>
+          <a:lstStyle/>
+          <a:p>
+            <a:r>
+              <a:rPr lang="en-IE" dirty="0"/>
+              <a:t>DRY</a:t>
+            </a:r>
+            <a:endParaRPr lang="LID4096" dirty="0"/>
+          </a:p>
+        </p:txBody>
+      </p:sp>
+      <p:sp>
+        <p:nvSpPr>
+          <p:cNvPr id="3" name="Content Placeholder 2">
+            <a:extLst>
+              <a:ext uri="{FF2B5EF4-FFF2-40B4-BE49-F238E27FC236}">
+                <a16:creationId xmlns:a16="http://schemas.microsoft.com/office/drawing/2014/main" id="{BA1F535B-F724-40FF-8235-F70AD32E75BE}"/>
+              </a:ext>
+            </a:extLst>
+          </p:cNvPr>
+          <p:cNvSpPr>
+            <a:spLocks noGrp="1"/>
+          </p:cNvSpPr>
+          <p:nvPr>
+            <p:ph idx="1"/>
+          </p:nvPr>
+        </p:nvSpPr>
+        <p:spPr/>
+        <p:txBody>
+          <a:bodyPr/>
+          <a:lstStyle/>
+          <a:p>
+            <a:r>
+              <a:rPr lang="en-IE" b="1" dirty="0"/>
+              <a:t>D</a:t>
+            </a:r>
+            <a:r>
+              <a:rPr lang="en-IE" dirty="0"/>
+              <a:t>on’t </a:t>
+            </a:r>
+            <a:r>
+              <a:rPr lang="en-IE" b="1" dirty="0"/>
+              <a:t>R</a:t>
+            </a:r>
+            <a:r>
+              <a:rPr lang="en-IE" dirty="0"/>
+              <a:t>epeat </a:t>
+            </a:r>
+            <a:r>
+              <a:rPr lang="en-IE" b="1" dirty="0"/>
+              <a:t>Y</a:t>
+            </a:r>
+            <a:r>
+              <a:rPr lang="en-IE" dirty="0"/>
+              <a:t>ourself</a:t>
+            </a:r>
+          </a:p>
+          <a:p>
+            <a:pPr lvl="1"/>
+            <a:r>
+              <a:rPr lang="en-IE" dirty="0"/>
+              <a:t>When you find yourself re-writing code, you are making your code prone to error</a:t>
+            </a:r>
+          </a:p>
+          <a:p>
+            <a:pPr lvl="1"/>
+            <a:r>
+              <a:rPr lang="en-IE" dirty="0"/>
+              <a:t>Any changes to this code need to happen in many places</a:t>
+            </a:r>
+          </a:p>
+          <a:p>
+            <a:pPr lvl="1"/>
+            <a:r>
+              <a:rPr lang="en-IE" dirty="0"/>
+              <a:t>Keep it in one single place, and changes there will trickle down to where it is needed.</a:t>
+            </a:r>
+          </a:p>
+          <a:p>
+            <a:endParaRPr lang="LID4096" dirty="0"/>
+          </a:p>
+        </p:txBody>
+      </p:sp>
+    </p:spTree>
+    <p:extLst>
+      <p:ext uri="{BB962C8B-B14F-4D97-AF65-F5344CB8AC3E}">
+        <p14:creationId xmlns:p14="http://schemas.microsoft.com/office/powerpoint/2010/main" val="3602439729"/>
+      </p:ext>
+    </p:extLst>
+  </p:cSld>
+  <p:clrMapOvr>
+    <a:masterClrMapping/>
+  </p:clrMapOvr>
+</p:sld>
+</file>
+
+<file path=ppt/slides/slide11.xml><?xml version="1.0" encoding="utf-8"?>
+<p:sld xmlns:a="http://schemas.openxmlformats.org/drawingml/2006/main" xmlns:r="http://schemas.openxmlformats.org/officeDocument/2006/relationships" xmlns:p="http://schemas.openxmlformats.org/presentationml/2006/main">
+  <p:cSld>
+    <p:spTree>
+      <p:nvGrpSpPr>
+        <p:cNvPr id="1" name=""/>
+        <p:cNvGrpSpPr/>
+        <p:nvPr/>
+      </p:nvGrpSpPr>
+      <p:grpSpPr>
+        <a:xfrm>
+          <a:off x="0" y="0"/>
+          <a:ext cx="0" cy="0"/>
+          <a:chOff x="0" y="0"/>
+          <a:chExt cx="0" cy="0"/>
+        </a:xfrm>
+      </p:grpSpPr>
+      <p:sp>
+        <p:nvSpPr>
+          <p:cNvPr id="2" name="Title 1">
+            <a:extLst>
+              <a:ext uri="{FF2B5EF4-FFF2-40B4-BE49-F238E27FC236}">
+                <a16:creationId xmlns:a16="http://schemas.microsoft.com/office/drawing/2014/main" id="{0184B1BD-4D6A-4AAA-BBB2-05D21F40D595}"/>
+              </a:ext>
+            </a:extLst>
+          </p:cNvPr>
+          <p:cNvSpPr>
+            <a:spLocks noGrp="1"/>
+          </p:cNvSpPr>
+          <p:nvPr>
+            <p:ph type="title"/>
+          </p:nvPr>
+        </p:nvSpPr>
+        <p:spPr/>
+        <p:txBody>
+          <a:bodyPr/>
+          <a:lstStyle/>
+          <a:p>
+            <a:r>
+              <a:rPr lang="en-IE" dirty="0"/>
+              <a:t>SOLID</a:t>
+            </a:r>
+            <a:endParaRPr lang="LID4096" dirty="0"/>
+          </a:p>
+        </p:txBody>
+      </p:sp>
+      <p:sp>
+        <p:nvSpPr>
+          <p:cNvPr id="3" name="Content Placeholder 2">
+            <a:extLst>
+              <a:ext uri="{FF2B5EF4-FFF2-40B4-BE49-F238E27FC236}">
+                <a16:creationId xmlns:a16="http://schemas.microsoft.com/office/drawing/2014/main" id="{9408A7B0-5946-4A46-A9A9-DFC9B08090AA}"/>
+              </a:ext>
+            </a:extLst>
+          </p:cNvPr>
+          <p:cNvSpPr>
+            <a:spLocks noGrp="1"/>
+          </p:cNvSpPr>
+          <p:nvPr>
+            <p:ph idx="1"/>
+          </p:nvPr>
+        </p:nvSpPr>
+        <p:spPr/>
+        <p:txBody>
+          <a:bodyPr/>
+          <a:lstStyle/>
+          <a:p>
+            <a:r>
+              <a:rPr lang="en-IE" dirty="0"/>
+              <a:t>SOLID is a set of 5 principles for writing good OOP code.</a:t>
+            </a:r>
+          </a:p>
+          <a:p>
+            <a:r>
+              <a:rPr lang="en-IE" dirty="0"/>
+              <a:t>Some are more complicated than others, and touch on things you haven’t studied yet. But the principles are very helpful</a:t>
+            </a:r>
+          </a:p>
+          <a:p>
+            <a:pPr marL="0" indent="0">
+              <a:buNone/>
+            </a:pPr>
+            <a:endParaRPr lang="LID4096" dirty="0"/>
+          </a:p>
+        </p:txBody>
+      </p:sp>
+    </p:spTree>
+    <p:extLst>
+      <p:ext uri="{BB962C8B-B14F-4D97-AF65-F5344CB8AC3E}">
+        <p14:creationId xmlns:p14="http://schemas.microsoft.com/office/powerpoint/2010/main" val="1448036639"/>
+      </p:ext>
+    </p:extLst>
+  </p:cSld>
+  <p:clrMapOvr>
+    <a:masterClrMapping/>
+  </p:clrMapOvr>
+</p:sld>
+</file>
+
+<file path=ppt/slides/slide12.xml><?xml version="1.0" encoding="utf-8"?>
+<p:sld xmlns:a="http://schemas.openxmlformats.org/drawingml/2006/main" xmlns:r="http://schemas.openxmlformats.org/officeDocument/2006/relationships" xmlns:p="http://schemas.openxmlformats.org/presentationml/2006/main">
+  <p:cSld>
+    <p:spTree>
+      <p:nvGrpSpPr>
+        <p:cNvPr id="1" name=""/>
+        <p:cNvGrpSpPr/>
+        <p:nvPr/>
+      </p:nvGrpSpPr>
+      <p:grpSpPr>
+        <a:xfrm>
+          <a:off x="0" y="0"/>
+          <a:ext cx="0" cy="0"/>
+          <a:chOff x="0" y="0"/>
+          <a:chExt cx="0" cy="0"/>
+        </a:xfrm>
+      </p:grpSpPr>
+      <p:sp>
+        <p:nvSpPr>
+          <p:cNvPr id="2" name="Title 1">
+            <a:extLst>
+              <a:ext uri="{FF2B5EF4-FFF2-40B4-BE49-F238E27FC236}">
+                <a16:creationId xmlns:a16="http://schemas.microsoft.com/office/drawing/2014/main" id="{0184B1BD-4D6A-4AAA-BBB2-05D21F40D595}"/>
+              </a:ext>
+            </a:extLst>
+          </p:cNvPr>
+          <p:cNvSpPr>
+            <a:spLocks noGrp="1"/>
+          </p:cNvSpPr>
+          <p:nvPr>
+            <p:ph type="title"/>
+          </p:nvPr>
+        </p:nvSpPr>
+        <p:spPr/>
+        <p:txBody>
+          <a:bodyPr/>
+          <a:lstStyle/>
+          <a:p>
+            <a:r>
+              <a:rPr lang="en-IE" dirty="0"/>
+              <a:t>SOLID</a:t>
+            </a:r>
+            <a:endParaRPr lang="LID4096" dirty="0"/>
+          </a:p>
+        </p:txBody>
+      </p:sp>
+      <p:sp>
+        <p:nvSpPr>
+          <p:cNvPr id="3" name="Content Placeholder 2">
+            <a:extLst>
+              <a:ext uri="{FF2B5EF4-FFF2-40B4-BE49-F238E27FC236}">
+                <a16:creationId xmlns:a16="http://schemas.microsoft.com/office/drawing/2014/main" id="{9408A7B0-5946-4A46-A9A9-DFC9B08090AA}"/>
+              </a:ext>
+            </a:extLst>
+          </p:cNvPr>
+          <p:cNvSpPr>
+            <a:spLocks noGrp="1"/>
+          </p:cNvSpPr>
+          <p:nvPr>
+            <p:ph idx="1"/>
+          </p:nvPr>
+        </p:nvSpPr>
+        <p:spPr/>
+        <p:txBody>
+          <a:bodyPr/>
+          <a:lstStyle/>
+          <a:p>
+            <a:r>
+              <a:rPr lang="en-IE" b="1" dirty="0"/>
+              <a:t>S</a:t>
+            </a:r>
+            <a:r>
+              <a:rPr lang="en-IE" dirty="0"/>
+              <a:t>ingle Responsibility Principle</a:t>
+            </a:r>
+            <a:endParaRPr lang="en-IE" b="1" dirty="0"/>
+          </a:p>
+          <a:p>
+            <a:r>
+              <a:rPr lang="en-IE" b="1" dirty="0"/>
+              <a:t>O</a:t>
+            </a:r>
+            <a:r>
+              <a:rPr lang="en-IE" dirty="0"/>
+              <a:t>pen-Closed Principle</a:t>
+            </a:r>
+            <a:endParaRPr lang="en-IE" b="1" dirty="0"/>
+          </a:p>
+          <a:p>
+            <a:r>
+              <a:rPr lang="en-IE" b="1" dirty="0" err="1"/>
+              <a:t>L</a:t>
+            </a:r>
+            <a:r>
+              <a:rPr lang="en-IE" dirty="0" err="1"/>
+              <a:t>iskov</a:t>
+            </a:r>
+            <a:r>
+              <a:rPr lang="en-IE" dirty="0"/>
+              <a:t> Substitution Principle</a:t>
+            </a:r>
+            <a:endParaRPr lang="en-IE" b="1" dirty="0"/>
+          </a:p>
+          <a:p>
+            <a:r>
+              <a:rPr lang="en-IE" b="1" dirty="0"/>
+              <a:t>I</a:t>
+            </a:r>
+            <a:r>
+              <a:rPr lang="en-IE" dirty="0"/>
+              <a:t>nterface </a:t>
+            </a:r>
+            <a:r>
+              <a:rPr lang="en-IE" dirty="0" err="1"/>
+              <a:t>Secregegation</a:t>
+            </a:r>
+            <a:r>
+              <a:rPr lang="en-IE" dirty="0"/>
+              <a:t> Principle</a:t>
+            </a:r>
+            <a:endParaRPr lang="en-IE" b="1" dirty="0"/>
+          </a:p>
+          <a:p>
+            <a:r>
+              <a:rPr lang="en-IE" b="1" dirty="0"/>
+              <a:t>D</a:t>
+            </a:r>
+            <a:r>
+              <a:rPr lang="en-IE" dirty="0"/>
+              <a:t>ependency Inversion Principle</a:t>
+            </a:r>
+            <a:endParaRPr lang="en-IE" b="1" dirty="0"/>
+          </a:p>
+          <a:p>
+            <a:pPr marL="0" indent="0">
+              <a:buNone/>
+            </a:pPr>
+            <a:endParaRPr lang="LID4096" dirty="0"/>
+          </a:p>
+        </p:txBody>
+      </p:sp>
+    </p:spTree>
+    <p:extLst>
+      <p:ext uri="{BB962C8B-B14F-4D97-AF65-F5344CB8AC3E}">
+        <p14:creationId xmlns:p14="http://schemas.microsoft.com/office/powerpoint/2010/main" val="136502817"/>
+      </p:ext>
+    </p:extLst>
+  </p:cSld>
+  <p:clrMapOvr>
+    <a:masterClrMapping/>
+  </p:clrMapOvr>
+</p:sld>
+</file>
+
+<file path=ppt/slides/slide13.xml><?xml version="1.0" encoding="utf-8"?>
+<p:sld xmlns:a="http://schemas.openxmlformats.org/drawingml/2006/main" xmlns:r="http://schemas.openxmlformats.org/officeDocument/2006/relationships" xmlns:p="http://schemas.openxmlformats.org/presentationml/2006/main">
+  <p:cSld>
+    <p:spTree>
+      <p:nvGrpSpPr>
+        <p:cNvPr id="1" name=""/>
+        <p:cNvGrpSpPr/>
+        <p:nvPr/>
+      </p:nvGrpSpPr>
+      <p:grpSpPr>
+        <a:xfrm>
+          <a:off x="0" y="0"/>
+          <a:ext cx="0" cy="0"/>
+          <a:chOff x="0" y="0"/>
+          <a:chExt cx="0" cy="0"/>
+        </a:xfrm>
+      </p:grpSpPr>
+      <p:sp>
+        <p:nvSpPr>
+          <p:cNvPr id="2" name="Title 1">
+            <a:extLst>
+              <a:ext uri="{FF2B5EF4-FFF2-40B4-BE49-F238E27FC236}">
+                <a16:creationId xmlns:a16="http://schemas.microsoft.com/office/drawing/2014/main" id="{0184B1BD-4D6A-4AAA-BBB2-05D21F40D595}"/>
+              </a:ext>
+            </a:extLst>
+          </p:cNvPr>
+          <p:cNvSpPr>
+            <a:spLocks noGrp="1"/>
+          </p:cNvSpPr>
+          <p:nvPr>
+            <p:ph type="title"/>
+          </p:nvPr>
+        </p:nvSpPr>
+        <p:spPr/>
+        <p:txBody>
+          <a:bodyPr/>
+          <a:lstStyle/>
+          <a:p>
+            <a:r>
+              <a:rPr lang="en-IE" dirty="0"/>
+              <a:t>SOLID</a:t>
+            </a:r>
+            <a:endParaRPr lang="LID4096" dirty="0"/>
+          </a:p>
+        </p:txBody>
+      </p:sp>
+      <p:sp>
+        <p:nvSpPr>
+          <p:cNvPr id="3" name="Content Placeholder 2">
+            <a:extLst>
+              <a:ext uri="{FF2B5EF4-FFF2-40B4-BE49-F238E27FC236}">
+                <a16:creationId xmlns:a16="http://schemas.microsoft.com/office/drawing/2014/main" id="{9408A7B0-5946-4A46-A9A9-DFC9B08090AA}"/>
+              </a:ext>
+            </a:extLst>
+          </p:cNvPr>
+          <p:cNvSpPr>
+            <a:spLocks noGrp="1"/>
+          </p:cNvSpPr>
+          <p:nvPr>
+            <p:ph idx="1"/>
+          </p:nvPr>
+        </p:nvSpPr>
+        <p:spPr/>
+        <p:txBody>
+          <a:bodyPr>
+            <a:normAutofit fontScale="70000" lnSpcReduction="20000"/>
+          </a:bodyPr>
+          <a:lstStyle/>
+          <a:p>
+            <a:r>
+              <a:rPr lang="en-IE" b="1" dirty="0"/>
+              <a:t>S</a:t>
+            </a:r>
+            <a:r>
+              <a:rPr lang="en-IE" dirty="0"/>
+              <a:t>ingle Responsibility Principle</a:t>
+            </a:r>
+          </a:p>
+          <a:p>
+            <a:pPr lvl="1"/>
+            <a:r>
+              <a:rPr lang="en-IE" dirty="0"/>
+              <a:t>Use small classes with clear purposes</a:t>
+            </a:r>
+          </a:p>
+          <a:p>
+            <a:r>
+              <a:rPr lang="en-IE" b="1" dirty="0"/>
+              <a:t>O</a:t>
+            </a:r>
+            <a:r>
+              <a:rPr lang="en-IE" dirty="0"/>
+              <a:t>pen-Closed Principle</a:t>
+            </a:r>
+          </a:p>
+          <a:p>
+            <a:pPr lvl="1"/>
+            <a:r>
+              <a:rPr lang="en-IE" dirty="0"/>
+              <a:t>Make use of Polymorphism</a:t>
+            </a:r>
+          </a:p>
+          <a:p>
+            <a:r>
+              <a:rPr lang="en-IE" b="1" dirty="0" err="1"/>
+              <a:t>L</a:t>
+            </a:r>
+            <a:r>
+              <a:rPr lang="en-IE" dirty="0" err="1"/>
+              <a:t>iskov</a:t>
+            </a:r>
+            <a:r>
+              <a:rPr lang="en-IE" dirty="0"/>
+              <a:t> Substitution Principle</a:t>
+            </a:r>
+          </a:p>
+          <a:p>
+            <a:pPr lvl="1"/>
+            <a:r>
+              <a:rPr lang="en-IE" dirty="0"/>
+              <a:t>Refer to subclasses by their </a:t>
+            </a:r>
+            <a:r>
+              <a:rPr lang="en-IE" dirty="0" err="1"/>
+              <a:t>superclasses</a:t>
+            </a:r>
+            <a:r>
+              <a:rPr lang="en-IE" dirty="0"/>
+              <a:t> when possible</a:t>
+            </a:r>
+          </a:p>
+          <a:p>
+            <a:r>
+              <a:rPr lang="en-IE" b="1" dirty="0"/>
+              <a:t>I</a:t>
+            </a:r>
+            <a:r>
+              <a:rPr lang="en-IE" dirty="0"/>
+              <a:t>nterface </a:t>
+            </a:r>
+            <a:r>
+              <a:rPr lang="en-IE" dirty="0" err="1"/>
+              <a:t>Secregegation</a:t>
+            </a:r>
+            <a:r>
+              <a:rPr lang="en-IE" dirty="0"/>
+              <a:t> Principle</a:t>
+            </a:r>
+          </a:p>
+          <a:p>
+            <a:pPr lvl="1"/>
+            <a:r>
+              <a:rPr lang="en-IE" dirty="0"/>
+              <a:t>It’s better to have many small interfaces than a few large ones</a:t>
+            </a:r>
+          </a:p>
+          <a:p>
+            <a:r>
+              <a:rPr lang="en-IE" b="1" dirty="0"/>
+              <a:t>D</a:t>
+            </a:r>
+            <a:r>
+              <a:rPr lang="en-IE" dirty="0"/>
+              <a:t>ependency Inversion Principle</a:t>
+            </a:r>
+          </a:p>
+          <a:p>
+            <a:pPr lvl="1"/>
+            <a:r>
+              <a:rPr lang="en-IE" dirty="0"/>
+              <a:t>Separate Data and Logic </a:t>
+            </a:r>
+            <a:r>
+              <a:rPr lang="en-IE"/>
+              <a:t>in your code</a:t>
+            </a:r>
+            <a:endParaRPr lang="en-IE" dirty="0"/>
+          </a:p>
+          <a:p>
+            <a:pPr marL="0" indent="0">
+              <a:buNone/>
+            </a:pPr>
+            <a:endParaRPr lang="LID4096" dirty="0"/>
+          </a:p>
+        </p:txBody>
+      </p:sp>
+    </p:spTree>
+    <p:extLst>
+      <p:ext uri="{BB962C8B-B14F-4D97-AF65-F5344CB8AC3E}">
+        <p14:creationId xmlns:p14="http://schemas.microsoft.com/office/powerpoint/2010/main" val="3763115642"/>
       </p:ext>
     </p:extLst>
   </p:cSld>
@@ -13234,11 +13827,7 @@
           <a:p>
             <a:r>
               <a:rPr lang="en-IE" dirty="0"/>
-              <a:t>Git Flow</a:t>
-            </a:r>
-            <a:r>
-              <a:rPr lang="en-IE"/>
-              <a:t>: Should I use it?</a:t>
+              <a:t>Git Flow: Should I use it?</a:t>
             </a:r>
             <a:endParaRPr lang="LID4096" dirty="0"/>
           </a:p>
@@ -13314,7 +13903,14 @@
             <a:pPr lvl="1"/>
             <a:r>
               <a:rPr lang="en-IE" dirty="0"/>
-              <a:t>Always write new code in a branch, never in the main branch</a:t>
+              <a:t>Always write new code in a feature branch, never in the main branch</a:t>
+            </a:r>
+          </a:p>
+          <a:p>
+            <a:pPr lvl="1"/>
+            <a:r>
+              <a:rPr lang="en-IE" dirty="0"/>
+              <a:t>Try keep a “current working version” on master</a:t>
             </a:r>
           </a:p>
         </p:txBody>
@@ -13323,6 +13919,99 @@
     <p:extLst>
       <p:ext uri="{BB962C8B-B14F-4D97-AF65-F5344CB8AC3E}">
         <p14:creationId xmlns:p14="http://schemas.microsoft.com/office/powerpoint/2010/main" val="3206392519"/>
+      </p:ext>
+    </p:extLst>
+  </p:cSld>
+  <p:clrMapOvr>
+    <a:masterClrMapping/>
+  </p:clrMapOvr>
+</p:sld>
+</file>
+
+<file path=ppt/slides/slide9.xml><?xml version="1.0" encoding="utf-8"?>
+<p:sld xmlns:a="http://schemas.openxmlformats.org/drawingml/2006/main" xmlns:r="http://schemas.openxmlformats.org/officeDocument/2006/relationships" xmlns:p="http://schemas.openxmlformats.org/presentationml/2006/main">
+  <p:cSld>
+    <p:spTree>
+      <p:nvGrpSpPr>
+        <p:cNvPr id="1" name=""/>
+        <p:cNvGrpSpPr/>
+        <p:nvPr/>
+      </p:nvGrpSpPr>
+      <p:grpSpPr>
+        <a:xfrm>
+          <a:off x="0" y="0"/>
+          <a:ext cx="0" cy="0"/>
+          <a:chOff x="0" y="0"/>
+          <a:chExt cx="0" cy="0"/>
+        </a:xfrm>
+      </p:grpSpPr>
+      <p:sp>
+        <p:nvSpPr>
+          <p:cNvPr id="2" name="Title 1">
+            <a:extLst>
+              <a:ext uri="{FF2B5EF4-FFF2-40B4-BE49-F238E27FC236}">
+                <a16:creationId xmlns:a16="http://schemas.microsoft.com/office/drawing/2014/main" id="{0C301BDA-2C77-43F8-892D-A9FC694FF4AD}"/>
+              </a:ext>
+            </a:extLst>
+          </p:cNvPr>
+          <p:cNvSpPr>
+            <a:spLocks noGrp="1"/>
+          </p:cNvSpPr>
+          <p:nvPr>
+            <p:ph type="title"/>
+          </p:nvPr>
+        </p:nvSpPr>
+        <p:spPr/>
+        <p:txBody>
+          <a:bodyPr/>
+          <a:lstStyle/>
+          <a:p>
+            <a:r>
+              <a:rPr lang="en-IE" dirty="0"/>
+              <a:t>Object Oriented Programming TIPs</a:t>
+            </a:r>
+            <a:endParaRPr lang="LID4096" dirty="0"/>
+          </a:p>
+        </p:txBody>
+      </p:sp>
+      <p:sp>
+        <p:nvSpPr>
+          <p:cNvPr id="3" name="Content Placeholder 2">
+            <a:extLst>
+              <a:ext uri="{FF2B5EF4-FFF2-40B4-BE49-F238E27FC236}">
+                <a16:creationId xmlns:a16="http://schemas.microsoft.com/office/drawing/2014/main" id="{C0C901FE-C092-4103-9154-6F25832BCB9D}"/>
+              </a:ext>
+            </a:extLst>
+          </p:cNvPr>
+          <p:cNvSpPr>
+            <a:spLocks noGrp="1"/>
+          </p:cNvSpPr>
+          <p:nvPr>
+            <p:ph idx="1"/>
+          </p:nvPr>
+        </p:nvSpPr>
+        <p:spPr/>
+        <p:txBody>
+          <a:bodyPr/>
+          <a:lstStyle/>
+          <a:p>
+            <a:r>
+              <a:rPr lang="en-IE" dirty="0"/>
+              <a:t>Your code should be DRY and SOLID</a:t>
+            </a:r>
+          </a:p>
+          <a:p>
+            <a:pPr marL="457200" lvl="1" indent="0">
+              <a:buNone/>
+            </a:pPr>
+            <a:endParaRPr lang="LID4096" dirty="0"/>
+          </a:p>
+        </p:txBody>
+      </p:sp>
+    </p:spTree>
+    <p:extLst>
+      <p:ext uri="{BB962C8B-B14F-4D97-AF65-F5344CB8AC3E}">
+        <p14:creationId xmlns:p14="http://schemas.microsoft.com/office/powerpoint/2010/main" val="777623175"/>
       </p:ext>
     </p:extLst>
   </p:cSld>

</xml_diff>